<commit_message>
project mid bootcamp ready
</commit_message>
<xml_diff>
--- a/ppt/Presentation2.pptx
+++ b/ppt/Presentation2.pptx
@@ -3850,7 +3850,7 @@
         <p:spPr>
           <a:xfrm>
             <a:off x="511749" y="487380"/>
-            <a:ext cx="4758894" cy="1200329"/>
+            <a:ext cx="4758894" cy="646331"/>
           </a:xfrm>
           <a:prstGeom prst="rect">
             <a:avLst/>
@@ -3881,15 +3881,7 @@
             </a:r>
             <a:r>
               <a:rPr lang="nl-NL" dirty="0"/>
-              <a:t> a </a:t>
-            </a:r>
-            <a:r>
-              <a:rPr lang="nl-NL" dirty="0" err="1"/>
-              <a:t>strategic</a:t>
-            </a:r>
-            <a:r>
-              <a:rPr lang="nl-NL" dirty="0"/>
-              <a:t> </a:t>
+              <a:t> a STRATEGIC </a:t>
             </a:r>
             <a:r>
               <a:rPr lang="nl-NL" dirty="0" err="1"/>
@@ -3929,19 +3921,11 @@
             </a:r>
             <a:r>
               <a:rPr lang="nl-NL" dirty="0"/>
-              <a:t> is </a:t>
-            </a:r>
-            <a:r>
-              <a:rPr lang="nl-NL" dirty="0" err="1"/>
-              <a:t>still</a:t>
-            </a:r>
-            <a:r>
-              <a:rPr lang="nl-NL" dirty="0"/>
-              <a:t> </a:t>
-            </a:r>
-            <a:r>
-              <a:rPr lang="nl-NL" dirty="0" err="1"/>
-              <a:t>there</a:t>
+              <a:t> </a:t>
+            </a:r>
+            <a:r>
+              <a:rPr lang="nl-NL" dirty="0" err="1"/>
+              <a:t>exists</a:t>
             </a:r>
             <a:r>
               <a:rPr lang="nl-NL" dirty="0"/>
@@ -3949,28 +3933,8 @@
             </a:r>
             <a:r>
               <a:rPr lang="nl-NL" dirty="0" err="1"/>
-              <a:t>provinde</a:t>
-            </a:r>
-            <a:r>
-              <a:rPr lang="nl-NL" dirty="0"/>
-              <a:t> </a:t>
-            </a:r>
-            <a:r>
-              <a:rPr lang="nl-NL" dirty="0">
-                <a:sym typeface="Wingdings" pitchFamily="2" charset="2"/>
-              </a:rPr>
-              <a:t> </a:t>
-            </a:r>
-            <a:r>
-              <a:rPr lang="nl-NL" dirty="0"/>
-              <a:t>Scrollen: verhouding jobs</a:t>
-            </a:r>
-          </a:p>
-          <a:p>
-            <a:pPr marL="285750" indent="-285750">
-              <a:buFontTx/>
-              <a:buChar char="-"/>
-            </a:pPr>
+              <a:t>province</a:t>
+            </a:r>
             <a:endParaRPr lang="nl-NL" dirty="0"/>
           </a:p>
         </p:txBody>
@@ -4182,7 +4146,7 @@
         </p:blipFill>
         <p:spPr>
           <a:xfrm>
-            <a:off x="930029" y="6374386"/>
+            <a:off x="1692029" y="5805647"/>
             <a:ext cx="1442781" cy="483614"/>
           </a:xfrm>
           <a:prstGeom prst="rect">
@@ -4455,7 +4419,7 @@
         <p:spPr>
           <a:xfrm>
             <a:off x="583669" y="217327"/>
-            <a:ext cx="4481491" cy="923330"/>
+            <a:ext cx="4481491" cy="646331"/>
           </a:xfrm>
           <a:prstGeom prst="rect">
             <a:avLst/>
@@ -4470,53 +4434,8 @@
           <a:p>
             <a:r>
               <a:rPr lang="nl-NL" dirty="0"/>
-              <a:t>1. </a:t>
-            </a:r>
-            <a:r>
-              <a:rPr lang="nl-NL" dirty="0" err="1"/>
-              <a:t>This</a:t>
-            </a:r>
-            <a:r>
-              <a:rPr lang="nl-NL" dirty="0"/>
-              <a:t> dashboard has </a:t>
-            </a:r>
-            <a:r>
-              <a:rPr lang="nl-NL" dirty="0" err="1"/>
-              <a:t>also</a:t>
-            </a:r>
-            <a:r>
-              <a:rPr lang="nl-NL" dirty="0"/>
-              <a:t> a </a:t>
-            </a:r>
-            <a:r>
-              <a:rPr lang="nl-NL" dirty="0" err="1"/>
-              <a:t>detailed</a:t>
-            </a:r>
-            <a:r>
-              <a:rPr lang="nl-NL" dirty="0"/>
-              <a:t> page </a:t>
-            </a:r>
-            <a:r>
-              <a:rPr lang="nl-NL" dirty="0" err="1"/>
-              <a:t>where</a:t>
-            </a:r>
-            <a:r>
-              <a:rPr lang="nl-NL" dirty="0"/>
-              <a:t> </a:t>
-            </a:r>
-            <a:r>
-              <a:rPr lang="nl-NL" dirty="0" err="1"/>
-              <a:t>you</a:t>
-            </a:r>
-            <a:r>
-              <a:rPr lang="nl-NL" dirty="0"/>
-              <a:t> can zoom in more </a:t>
-            </a:r>
-            <a:r>
-              <a:rPr lang="nl-NL" dirty="0" err="1"/>
-              <a:t>locally</a:t>
-            </a:r>
-            <a:endParaRPr lang="nl-NL" dirty="0"/>
+              <a:t>1. IS DETAIL</a:t>
+            </a:r>
           </a:p>
           <a:p>
             <a:pPr marL="285750" indent="-285750">
@@ -4770,7 +4689,7 @@
         <p:spPr>
           <a:xfrm>
             <a:off x="275444" y="320069"/>
-            <a:ext cx="3710929" cy="2585323"/>
+            <a:ext cx="3710929" cy="4893647"/>
           </a:xfrm>
           <a:prstGeom prst="rect">
             <a:avLst/>
@@ -4782,6 +4701,83 @@
             <a:spAutoFit/>
           </a:bodyPr>
           <a:lstStyle/>
+          <a:p>
+            <a:pPr marL="342900" indent="-342900">
+              <a:buAutoNum type="arabicPeriod"/>
+            </a:pPr>
+            <a:r>
+              <a:rPr lang="nl-NL" dirty="0"/>
+              <a:t>On </a:t>
+            </a:r>
+            <a:r>
+              <a:rPr lang="nl-NL" dirty="0" err="1"/>
+              <a:t>tactical</a:t>
+            </a:r>
+            <a:r>
+              <a:rPr lang="nl-NL" dirty="0"/>
+              <a:t> level I </a:t>
+            </a:r>
+            <a:r>
+              <a:rPr lang="nl-NL" dirty="0" err="1"/>
+              <a:t>guess</a:t>
+            </a:r>
+            <a:r>
+              <a:rPr lang="nl-NL" dirty="0"/>
+              <a:t> </a:t>
+            </a:r>
+            <a:r>
+              <a:rPr lang="nl-NL" dirty="0" err="1"/>
+              <a:t>your</a:t>
+            </a:r>
+            <a:r>
+              <a:rPr lang="nl-NL" dirty="0"/>
+              <a:t> program managers want </a:t>
+            </a:r>
+            <a:r>
+              <a:rPr lang="nl-NL" dirty="0" err="1"/>
+              <a:t>to</a:t>
+            </a:r>
+            <a:r>
+              <a:rPr lang="nl-NL" dirty="0"/>
+              <a:t> </a:t>
+            </a:r>
+            <a:r>
+              <a:rPr lang="nl-NL" sz="2400" dirty="0"/>
+              <a:t>match open </a:t>
+            </a:r>
+            <a:r>
+              <a:rPr lang="nl-NL" sz="2400" dirty="0" err="1"/>
+              <a:t>vacancies</a:t>
+            </a:r>
+            <a:r>
+              <a:rPr lang="nl-NL" sz="2400" dirty="0"/>
+              <a:t> </a:t>
+            </a:r>
+            <a:r>
+              <a:rPr lang="nl-NL" sz="2400" dirty="0" err="1"/>
+              <a:t>to</a:t>
+            </a:r>
+            <a:r>
+              <a:rPr lang="nl-NL" sz="2400" dirty="0"/>
+              <a:t> job seekers</a:t>
+            </a:r>
+          </a:p>
+          <a:p>
+            <a:pPr marL="342900" indent="-342900">
+              <a:buAutoNum type="arabicPeriod"/>
+            </a:pPr>
+            <a:r>
+              <a:rPr lang="nl-NL" sz="2400" dirty="0"/>
+              <a:t>TECHNICALLY A MATCH WOULD BE POSSIBLE</a:t>
+            </a:r>
+            <a:endParaRPr lang="nl-NL" dirty="0"/>
+          </a:p>
+          <a:p>
+            <a:pPr marL="342900" indent="-342900">
+              <a:buAutoNum type="arabicPeriod"/>
+            </a:pPr>
+            <a:endParaRPr lang="nl-NL" dirty="0"/>
+          </a:p>
           <a:p>
             <a:pPr marL="342900" indent="-342900">
               <a:buAutoNum type="arabicPeriod"/>
@@ -5021,6 +5017,246 @@
           </a:prstGeom>
         </p:spPr>
       </p:pic>
+      <p:sp>
+        <p:nvSpPr>
+          <p:cNvPr id="9" name="TextBox 8">
+            <a:extLst>
+              <a:ext uri="{FF2B5EF4-FFF2-40B4-BE49-F238E27FC236}">
+                <a16:creationId xmlns:a16="http://schemas.microsoft.com/office/drawing/2014/main" id="{2BBB60CD-D384-4D4A-BC4C-2692B6CE8CE9}"/>
+              </a:ext>
+            </a:extLst>
+          </p:cNvPr>
+          <p:cNvSpPr txBox="1"/>
+          <p:nvPr/>
+        </p:nvSpPr>
+        <p:spPr>
+          <a:xfrm>
+            <a:off x="4835458" y="320068"/>
+            <a:ext cx="3887302" cy="1754326"/>
+          </a:xfrm>
+          <a:prstGeom prst="rect">
+            <a:avLst/>
+          </a:prstGeom>
+          <a:noFill/>
+        </p:spPr>
+        <p:txBody>
+          <a:bodyPr wrap="square" rtlCol="0">
+            <a:spAutoFit/>
+          </a:bodyPr>
+          <a:lstStyle/>
+          <a:p>
+            <a:r>
+              <a:rPr lang="nl-NL" dirty="0"/>
+              <a:t>2. And </a:t>
+            </a:r>
+            <a:r>
+              <a:rPr lang="nl-NL" dirty="0" err="1"/>
+              <a:t>drill</a:t>
+            </a:r>
+            <a:r>
+              <a:rPr lang="nl-NL" dirty="0"/>
+              <a:t> down on </a:t>
+            </a:r>
+            <a:r>
+              <a:rPr lang="nl-NL" dirty="0" err="1"/>
+              <a:t>certain</a:t>
+            </a:r>
+            <a:r>
+              <a:rPr lang="nl-NL" dirty="0"/>
+              <a:t> </a:t>
+            </a:r>
+            <a:r>
+              <a:rPr lang="nl-NL" dirty="0" err="1"/>
+              <a:t>areas</a:t>
+            </a:r>
+            <a:r>
+              <a:rPr lang="nl-NL" dirty="0"/>
+              <a:t> or job </a:t>
+            </a:r>
+            <a:r>
+              <a:rPr lang="nl-NL" dirty="0" err="1"/>
+              <a:t>groups</a:t>
+            </a:r>
+            <a:r>
+              <a:rPr lang="nl-NL" dirty="0"/>
+              <a:t> </a:t>
+            </a:r>
+          </a:p>
+          <a:p>
+            <a:r>
+              <a:rPr lang="nl-NL" dirty="0"/>
+              <a:t>grens streek magazijn medewerker </a:t>
+            </a:r>
+            <a:r>
+              <a:rPr lang="nl-NL" dirty="0">
+                <a:sym typeface="Wingdings" pitchFamily="2" charset="2"/>
+              </a:rPr>
+              <a:t> inzoomen: </a:t>
+            </a:r>
+            <a:r>
+              <a:rPr lang="nl-NL" dirty="0" err="1">
+                <a:sym typeface="Wingdings" pitchFamily="2" charset="2"/>
+              </a:rPr>
+              <a:t>local</a:t>
+            </a:r>
+            <a:r>
+              <a:rPr lang="nl-NL" dirty="0">
+                <a:sym typeface="Wingdings" pitchFamily="2" charset="2"/>
+              </a:rPr>
+              <a:t> matching </a:t>
+            </a:r>
+            <a:r>
+              <a:rPr lang="nl-NL" dirty="0" err="1">
+                <a:sym typeface="Wingdings" pitchFamily="2" charset="2"/>
+              </a:rPr>
+              <a:t>proposal</a:t>
+            </a:r>
+            <a:endParaRPr lang="nl-NL" dirty="0"/>
+          </a:p>
+          <a:p>
+            <a:endParaRPr lang="nl-NL" dirty="0"/>
+          </a:p>
+          <a:p>
+            <a:pPr marL="285750" indent="-285750">
+              <a:buFontTx/>
+              <a:buChar char="-"/>
+            </a:pPr>
+            <a:endParaRPr lang="nl-NL" dirty="0"/>
+          </a:p>
+        </p:txBody>
+      </p:sp>
+      <p:sp>
+        <p:nvSpPr>
+          <p:cNvPr id="10" name="TextBox 9">
+            <a:extLst>
+              <a:ext uri="{FF2B5EF4-FFF2-40B4-BE49-F238E27FC236}">
+                <a16:creationId xmlns:a16="http://schemas.microsoft.com/office/drawing/2014/main" id="{F9F0744A-4E7B-AB47-82FA-332BAE67C8D8}"/>
+              </a:ext>
+            </a:extLst>
+          </p:cNvPr>
+          <p:cNvSpPr txBox="1"/>
+          <p:nvPr/>
+        </p:nvSpPr>
+        <p:spPr>
+          <a:xfrm>
+            <a:off x="9318661" y="1569743"/>
+            <a:ext cx="2774270" cy="1754326"/>
+          </a:xfrm>
+          <a:prstGeom prst="rect">
+            <a:avLst/>
+          </a:prstGeom>
+          <a:noFill/>
+        </p:spPr>
+        <p:txBody>
+          <a:bodyPr wrap="square" rtlCol="0">
+            <a:spAutoFit/>
+          </a:bodyPr>
+          <a:lstStyle/>
+          <a:p>
+            <a:r>
+              <a:rPr lang="nl-NL" dirty="0"/>
+              <a:t>2. Midden: most </a:t>
+            </a:r>
+            <a:r>
+              <a:rPr lang="nl-NL" dirty="0" err="1"/>
+              <a:t>published</a:t>
+            </a:r>
+            <a:r>
+              <a:rPr lang="nl-NL" dirty="0"/>
+              <a:t> jobs. The program manager </a:t>
+            </a:r>
+          </a:p>
+          <a:p>
+            <a:r>
+              <a:rPr lang="nl-NL" dirty="0"/>
+              <a:t>match </a:t>
+            </a:r>
+            <a:r>
+              <a:rPr lang="nl-NL" dirty="0" err="1"/>
+              <a:t>with</a:t>
+            </a:r>
+            <a:r>
+              <a:rPr lang="nl-NL" dirty="0"/>
+              <a:t> </a:t>
+            </a:r>
+            <a:r>
+              <a:rPr lang="nl-NL" dirty="0" err="1"/>
+              <a:t>popularity</a:t>
+            </a:r>
+            <a:r>
+              <a:rPr lang="nl-NL" dirty="0"/>
+              <a:t> of </a:t>
+            </a:r>
+            <a:r>
+              <a:rPr lang="nl-NL" dirty="0" err="1"/>
+              <a:t>the</a:t>
+            </a:r>
+            <a:r>
+              <a:rPr lang="nl-NL" dirty="0"/>
+              <a:t> job </a:t>
+            </a:r>
+            <a:r>
+              <a:rPr lang="nl-NL" dirty="0" err="1"/>
+              <a:t>amongst</a:t>
+            </a:r>
+            <a:r>
+              <a:rPr lang="nl-NL" dirty="0"/>
+              <a:t> men and </a:t>
+            </a:r>
+            <a:r>
+              <a:rPr lang="nl-NL" dirty="0" err="1"/>
+              <a:t>women</a:t>
+            </a:r>
+            <a:endParaRPr lang="nl-NL" dirty="0"/>
+          </a:p>
+          <a:p>
+            <a:pPr marL="285750" indent="-285750">
+              <a:buFontTx/>
+              <a:buChar char="-"/>
+            </a:pPr>
+            <a:endParaRPr lang="nl-NL" dirty="0"/>
+          </a:p>
+        </p:txBody>
+      </p:sp>
+      <p:sp>
+        <p:nvSpPr>
+          <p:cNvPr id="4" name="TextBox 3">
+            <a:extLst>
+              <a:ext uri="{FF2B5EF4-FFF2-40B4-BE49-F238E27FC236}">
+                <a16:creationId xmlns:a16="http://schemas.microsoft.com/office/drawing/2014/main" id="{E5C99416-2327-A145-B04E-6310B6A8FA6D}"/>
+              </a:ext>
+            </a:extLst>
+          </p:cNvPr>
+          <p:cNvSpPr txBox="1"/>
+          <p:nvPr/>
+        </p:nvSpPr>
+        <p:spPr>
+          <a:xfrm>
+            <a:off x="7204365" y="5045596"/>
+            <a:ext cx="1415067" cy="369332"/>
+          </a:xfrm>
+          <a:prstGeom prst="rect">
+            <a:avLst/>
+          </a:prstGeom>
+          <a:noFill/>
+        </p:spPr>
+        <p:txBody>
+          <a:bodyPr wrap="none" rtlCol="0">
+            <a:spAutoFit/>
+          </a:bodyPr>
+          <a:lstStyle/>
+          <a:p>
+            <a:r>
+              <a:rPr lang="nl-NL" dirty="0" err="1"/>
+              <a:t>forklift</a:t>
+            </a:r>
+            <a:r>
+              <a:rPr lang="nl-NL" dirty="0"/>
+              <a:t> driver</a:t>
+            </a:r>
+          </a:p>
+        </p:txBody>
+      </p:sp>
     </p:spTree>
     <p:extLst>
       <p:ext uri="{BB962C8B-B14F-4D97-AF65-F5344CB8AC3E}">

</xml_diff>